<commit_message>
modificando la seccion experiencia
</commit_message>
<xml_diff>
--- a/src/assets/CV-Breiner Correa Atucsa.pptx
+++ b/src/assets/CV-Breiner Correa Atucsa.pptx
@@ -5662,8 +5662,8 @@
         </p:nvSpPr>
         <p:spPr>
           <a:xfrm>
-            <a:off x="3539487" y="9567798"/>
-            <a:ext cx="3950845" cy="941705"/>
+            <a:off x="3500245" y="9556926"/>
+            <a:ext cx="3959735" cy="1031373"/>
           </a:xfrm>
           <a:prstGeom prst="rect">
             <a:avLst/>
@@ -5682,6 +5682,9 @@
               <a:spcBef>
                 <a:spcPts val="360"/>
               </a:spcBef>
+              <a:spcAft>
+                <a:spcPts val="600"/>
+              </a:spcAft>
               <a:buFont typeface="Arial MT"/>
               <a:buChar char="•"/>
               <a:tabLst>
@@ -5914,7 +5917,7 @@
                 <a:spcPct val="131700"/>
               </a:lnSpc>
               <a:spcBef>
-                <a:spcPts val="15"/>
+                <a:spcPts val="265"/>
               </a:spcBef>
             </a:pPr>
             <a:r>
@@ -6380,7 +6383,7 @@
         </p:nvSpPr>
         <p:spPr>
           <a:xfrm>
-            <a:off x="3972330" y="5292546"/>
+            <a:off x="3929708" y="5663244"/>
             <a:ext cx="2885440" cy="193675"/>
           </a:xfrm>
           <a:prstGeom prst="rect">
@@ -6491,7 +6494,7 @@
               </a:rPr>
               <a:t>[2020]</a:t>
             </a:r>
-            <a:endParaRPr sz="1100">
+            <a:endParaRPr sz="1100" dirty="0">
               <a:latin typeface="Trebuchet MS"/>
               <a:cs typeface="Trebuchet MS"/>
             </a:endParaRPr>
@@ -6506,7 +6509,7 @@
         </p:nvSpPr>
         <p:spPr>
           <a:xfrm>
-            <a:off x="4006366" y="4936692"/>
+            <a:off x="3896412" y="5184513"/>
             <a:ext cx="3406140" cy="230504"/>
           </a:xfrm>
           <a:prstGeom prst="rect">
@@ -6650,7 +6653,7 @@
               </a:rPr>
               <a:t>PERU</a:t>
             </a:r>
-            <a:endParaRPr sz="1200">
+            <a:endParaRPr sz="1200" dirty="0">
               <a:latin typeface="Trebuchet MS"/>
               <a:cs typeface="Trebuchet MS"/>
             </a:endParaRPr>
@@ -6665,7 +6668,7 @@
         </p:nvSpPr>
         <p:spPr>
           <a:xfrm>
-            <a:off x="3986299" y="5614923"/>
+            <a:off x="3939422" y="5940127"/>
             <a:ext cx="3335020" cy="1955164"/>
           </a:xfrm>
           <a:prstGeom prst="rect">
@@ -6801,7 +6804,7 @@
               </a:rPr>
               <a:t>fin.</a:t>
             </a:r>
-            <a:endParaRPr sz="1200">
+            <a:endParaRPr sz="1200" dirty="0">
               <a:latin typeface="Trebuchet MS"/>
               <a:cs typeface="Trebuchet MS"/>
             </a:endParaRPr>
@@ -6970,7 +6973,7 @@
               </a:rPr>
               <a:t>angular</a:t>
             </a:r>
-            <a:endParaRPr sz="1200">
+            <a:endParaRPr sz="1200" dirty="0">
               <a:latin typeface="Trebuchet MS"/>
               <a:cs typeface="Trebuchet MS"/>
             </a:endParaRPr>
@@ -7079,7 +7082,7 @@
               </a:rPr>
               <a:t>de</a:t>
             </a:r>
-            <a:endParaRPr sz="1200">
+            <a:endParaRPr sz="1200" dirty="0">
               <a:latin typeface="Trebuchet MS"/>
               <a:cs typeface="Trebuchet MS"/>
             </a:endParaRPr>
@@ -7123,7 +7126,7 @@
               </a:rPr>
               <a:t>html</a:t>
             </a:r>
-            <a:endParaRPr sz="1200">
+            <a:endParaRPr sz="1200" dirty="0">
               <a:latin typeface="Trebuchet MS"/>
               <a:cs typeface="Trebuchet MS"/>
             </a:endParaRPr>
@@ -7252,7 +7255,7 @@
               </a:rPr>
               <a:t>spring</a:t>
             </a:r>
-            <a:endParaRPr sz="1200">
+            <a:endParaRPr sz="1200" dirty="0">
               <a:latin typeface="Trebuchet MS"/>
               <a:cs typeface="Trebuchet MS"/>
             </a:endParaRPr>
@@ -7351,7 +7354,7 @@
               </a:rPr>
               <a:t>spring</a:t>
             </a:r>
-            <a:endParaRPr sz="1200">
+            <a:endParaRPr sz="1200" dirty="0">
               <a:latin typeface="Trebuchet MS"/>
               <a:cs typeface="Trebuchet MS"/>
             </a:endParaRPr>
@@ -7366,7 +7369,7 @@
         </p:nvSpPr>
         <p:spPr>
           <a:xfrm>
-            <a:off x="3986299" y="7787004"/>
+            <a:off x="3944820" y="7985408"/>
             <a:ext cx="3324225" cy="990600"/>
           </a:xfrm>
           <a:prstGeom prst="rect">
@@ -7687,7 +7690,7 @@
               </a:rPr>
               <a:t>HTML.</a:t>
             </a:r>
-            <a:endParaRPr sz="1200">
+            <a:endParaRPr sz="1200" dirty="0">
               <a:latin typeface="Trebuchet MS"/>
               <a:cs typeface="Trebuchet MS"/>
             </a:endParaRPr>
@@ -9920,7 +9923,7 @@
         </p:nvSpPr>
         <p:spPr>
           <a:xfrm>
-            <a:off x="3886620" y="832070"/>
+            <a:off x="3976104" y="902137"/>
             <a:ext cx="2206625" cy="203200"/>
           </a:xfrm>
           <a:prstGeom prst="rect">
@@ -9991,7 +9994,7 @@
               </a:rPr>
               <a:t>[2020]</a:t>
             </a:r>
-            <a:endParaRPr sz="1150">
+            <a:endParaRPr sz="1150" dirty="0">
               <a:latin typeface="Trebuchet MS"/>
               <a:cs typeface="Trebuchet MS"/>
             </a:endParaRPr>
@@ -10006,7 +10009,7 @@
         </p:nvSpPr>
         <p:spPr>
           <a:xfrm>
-            <a:off x="3860611" y="561942"/>
+            <a:off x="3882888" y="542150"/>
             <a:ext cx="3535679" cy="213360"/>
           </a:xfrm>
           <a:prstGeom prst="rect">
@@ -10140,7 +10143,7 @@
               </a:rPr>
               <a:t>PERU</a:t>
             </a:r>
-            <a:endParaRPr sz="1200">
+            <a:endParaRPr sz="1200" dirty="0">
               <a:latin typeface="Trebuchet MS"/>
               <a:cs typeface="Trebuchet MS"/>
             </a:endParaRPr>
@@ -10155,7 +10158,7 @@
         </p:nvSpPr>
         <p:spPr>
           <a:xfrm>
-            <a:off x="3820872" y="1064896"/>
+            <a:off x="3982404" y="1153206"/>
             <a:ext cx="3136900" cy="1714500"/>
           </a:xfrm>
           <a:prstGeom prst="rect">
@@ -10922,8 +10925,8 @@
         </p:nvSpPr>
         <p:spPr>
           <a:xfrm>
-            <a:off x="3910099" y="2985548"/>
-            <a:ext cx="3372485" cy="1878964"/>
+            <a:off x="3960622" y="2919822"/>
+            <a:ext cx="3372485" cy="1012200"/>
           </a:xfrm>
           <a:prstGeom prst="rect">
             <a:avLst/>
@@ -11193,7 +11196,7 @@
               </a:rPr>
               <a:t>(8,9),</a:t>
             </a:r>
-            <a:endParaRPr sz="1200">
+            <a:endParaRPr sz="1200" dirty="0">
               <a:latin typeface="Trebuchet MS"/>
               <a:cs typeface="Trebuchet MS"/>
             </a:endParaRPr>
@@ -11284,306 +11287,7 @@
               </a:rPr>
               <a:t>.</a:t>
             </a:r>
-            <a:endParaRPr sz="1800">
-              <a:latin typeface="Trebuchet MS"/>
-              <a:cs typeface="Trebuchet MS"/>
-            </a:endParaRPr>
-          </a:p>
-          <a:p>
-            <a:pPr marL="12700">
-              <a:lnSpc>
-                <a:spcPct val="100000"/>
-              </a:lnSpc>
-              <a:spcBef>
-                <a:spcPts val="1070"/>
-              </a:spcBef>
-            </a:pPr>
-            <a:r>
-              <a:rPr sz="1400" b="1" spc="50" dirty="0">
-                <a:latin typeface="Trebuchet MS"/>
-                <a:cs typeface="Trebuchet MS"/>
-              </a:rPr>
-              <a:t>L</a:t>
-            </a:r>
-            <a:r>
-              <a:rPr sz="1400" b="1" spc="-210" dirty="0">
-                <a:latin typeface="Trebuchet MS"/>
-                <a:cs typeface="Trebuchet MS"/>
-              </a:rPr>
-              <a:t> </a:t>
-            </a:r>
-            <a:r>
-              <a:rPr sz="1400" b="1" spc="85" dirty="0">
-                <a:latin typeface="Trebuchet MS"/>
-                <a:cs typeface="Trebuchet MS"/>
-              </a:rPr>
-              <a:t>O</a:t>
-            </a:r>
-            <a:r>
-              <a:rPr sz="1400" b="1" spc="-210" dirty="0">
-                <a:latin typeface="Trebuchet MS"/>
-                <a:cs typeface="Trebuchet MS"/>
-              </a:rPr>
-              <a:t> </a:t>
-            </a:r>
-            <a:r>
-              <a:rPr sz="1400" b="1" spc="85" dirty="0">
-                <a:latin typeface="Trebuchet MS"/>
-                <a:cs typeface="Trebuchet MS"/>
-              </a:rPr>
-              <a:t>G</a:t>
-            </a:r>
-            <a:r>
-              <a:rPr sz="1400" b="1" spc="-204" dirty="0">
-                <a:latin typeface="Trebuchet MS"/>
-                <a:cs typeface="Trebuchet MS"/>
-              </a:rPr>
-              <a:t> </a:t>
-            </a:r>
-            <a:r>
-              <a:rPr sz="1400" b="1" spc="85" dirty="0">
-                <a:latin typeface="Trebuchet MS"/>
-                <a:cs typeface="Trebuchet MS"/>
-              </a:rPr>
-              <a:t>R</a:t>
-            </a:r>
-            <a:r>
-              <a:rPr sz="1400" b="1" spc="-215" dirty="0">
-                <a:latin typeface="Trebuchet MS"/>
-                <a:cs typeface="Trebuchet MS"/>
-              </a:rPr>
-              <a:t> </a:t>
-            </a:r>
-            <a:r>
-              <a:rPr sz="1400" b="1" spc="85" dirty="0">
-                <a:latin typeface="Trebuchet MS"/>
-                <a:cs typeface="Trebuchet MS"/>
-              </a:rPr>
-              <a:t>O</a:t>
-            </a:r>
-            <a:r>
-              <a:rPr sz="1400" b="1" spc="-225" dirty="0">
-                <a:latin typeface="Trebuchet MS"/>
-                <a:cs typeface="Trebuchet MS"/>
-              </a:rPr>
-              <a:t> </a:t>
-            </a:r>
-            <a:r>
-              <a:rPr sz="1400" b="1" spc="150" dirty="0">
-                <a:latin typeface="Trebuchet MS"/>
-                <a:cs typeface="Trebuchet MS"/>
-              </a:rPr>
-              <a:t>S</a:t>
-            </a:r>
-            <a:endParaRPr sz="1400">
-              <a:latin typeface="Trebuchet MS"/>
-              <a:cs typeface="Trebuchet MS"/>
-            </a:endParaRPr>
-          </a:p>
-          <a:p>
-            <a:pPr marL="102870">
-              <a:lnSpc>
-                <a:spcPct val="100000"/>
-              </a:lnSpc>
-              <a:spcBef>
-                <a:spcPts val="815"/>
-              </a:spcBef>
-            </a:pPr>
-            <a:r>
-              <a:rPr sz="1200" b="1" spc="110" dirty="0">
-                <a:solidFill>
-                  <a:srgbClr val="404040"/>
-                </a:solidFill>
-                <a:latin typeface="Trebuchet MS"/>
-                <a:cs typeface="Trebuchet MS"/>
-              </a:rPr>
-              <a:t>SALIDA</a:t>
-            </a:r>
-            <a:r>
-              <a:rPr sz="1200" b="1" spc="10" dirty="0">
-                <a:solidFill>
-                  <a:srgbClr val="404040"/>
-                </a:solidFill>
-                <a:latin typeface="Trebuchet MS"/>
-                <a:cs typeface="Trebuchet MS"/>
-              </a:rPr>
-              <a:t> </a:t>
-            </a:r>
-            <a:r>
-              <a:rPr sz="1200" b="1" spc="50" dirty="0">
-                <a:solidFill>
-                  <a:srgbClr val="404040"/>
-                </a:solidFill>
-                <a:latin typeface="Trebuchet MS"/>
-                <a:cs typeface="Trebuchet MS"/>
-              </a:rPr>
-              <a:t>A</a:t>
-            </a:r>
-            <a:r>
-              <a:rPr sz="1200" b="1" spc="20" dirty="0">
-                <a:solidFill>
-                  <a:srgbClr val="404040"/>
-                </a:solidFill>
-                <a:latin typeface="Trebuchet MS"/>
-                <a:cs typeface="Trebuchet MS"/>
-              </a:rPr>
-              <a:t> </a:t>
-            </a:r>
-            <a:r>
-              <a:rPr sz="1200" b="1" spc="130" dirty="0">
-                <a:solidFill>
-                  <a:srgbClr val="404040"/>
-                </a:solidFill>
-                <a:latin typeface="Trebuchet MS"/>
-                <a:cs typeface="Trebuchet MS"/>
-              </a:rPr>
-              <a:t>PRODUCCION</a:t>
-            </a:r>
-            <a:endParaRPr sz="1200">
-              <a:latin typeface="Trebuchet MS"/>
-              <a:cs typeface="Trebuchet MS"/>
-            </a:endParaRPr>
-          </a:p>
-          <a:p>
-            <a:pPr marL="96520">
-              <a:lnSpc>
-                <a:spcPct val="100000"/>
-              </a:lnSpc>
-              <a:spcBef>
-                <a:spcPts val="455"/>
-              </a:spcBef>
-            </a:pPr>
-            <a:r>
-              <a:rPr sz="1150" spc="114" dirty="0">
-                <a:solidFill>
-                  <a:srgbClr val="404040"/>
-                </a:solidFill>
-                <a:latin typeface="Trebuchet MS"/>
-                <a:cs typeface="Trebuchet MS"/>
-              </a:rPr>
-              <a:t>De</a:t>
-            </a:r>
-            <a:r>
-              <a:rPr sz="1150" spc="65" dirty="0">
-                <a:solidFill>
-                  <a:srgbClr val="404040"/>
-                </a:solidFill>
-                <a:latin typeface="Trebuchet MS"/>
-                <a:cs typeface="Trebuchet MS"/>
-              </a:rPr>
-              <a:t> </a:t>
-            </a:r>
-            <a:r>
-              <a:rPr sz="1150" spc="85" dirty="0">
-                <a:solidFill>
-                  <a:srgbClr val="404040"/>
-                </a:solidFill>
-                <a:latin typeface="Trebuchet MS"/>
-                <a:cs typeface="Trebuchet MS"/>
-              </a:rPr>
-              <a:t>los</a:t>
-            </a:r>
-            <a:r>
-              <a:rPr sz="1150" spc="45" dirty="0">
-                <a:solidFill>
-                  <a:srgbClr val="404040"/>
-                </a:solidFill>
-                <a:latin typeface="Trebuchet MS"/>
-                <a:cs typeface="Trebuchet MS"/>
-              </a:rPr>
-              <a:t> </a:t>
-            </a:r>
-            <a:r>
-              <a:rPr sz="1150" spc="114" dirty="0">
-                <a:solidFill>
-                  <a:srgbClr val="404040"/>
-                </a:solidFill>
-                <a:latin typeface="Trebuchet MS"/>
-                <a:cs typeface="Trebuchet MS"/>
-              </a:rPr>
-              <a:t>módulos</a:t>
-            </a:r>
-            <a:r>
-              <a:rPr sz="1150" spc="30" dirty="0">
-                <a:solidFill>
-                  <a:srgbClr val="404040"/>
-                </a:solidFill>
-                <a:latin typeface="Trebuchet MS"/>
-                <a:cs typeface="Trebuchet MS"/>
-              </a:rPr>
-              <a:t> </a:t>
-            </a:r>
-            <a:r>
-              <a:rPr sz="1150" spc="95" dirty="0">
-                <a:solidFill>
-                  <a:srgbClr val="404040"/>
-                </a:solidFill>
-                <a:latin typeface="Trebuchet MS"/>
-                <a:cs typeface="Trebuchet MS"/>
-              </a:rPr>
-              <a:t>de</a:t>
-            </a:r>
-            <a:r>
-              <a:rPr sz="1150" spc="80" dirty="0">
-                <a:solidFill>
-                  <a:srgbClr val="404040"/>
-                </a:solidFill>
-                <a:latin typeface="Trebuchet MS"/>
-                <a:cs typeface="Trebuchet MS"/>
-              </a:rPr>
-              <a:t> </a:t>
-            </a:r>
-            <a:r>
-              <a:rPr sz="1150" spc="70" dirty="0">
-                <a:solidFill>
-                  <a:srgbClr val="404040"/>
-                </a:solidFill>
-                <a:latin typeface="Trebuchet MS"/>
-                <a:cs typeface="Trebuchet MS"/>
-              </a:rPr>
-              <a:t>atención</a:t>
-            </a:r>
-            <a:r>
-              <a:rPr sz="1150" spc="45" dirty="0">
-                <a:solidFill>
-                  <a:srgbClr val="404040"/>
-                </a:solidFill>
-                <a:latin typeface="Trebuchet MS"/>
-                <a:cs typeface="Trebuchet MS"/>
-              </a:rPr>
-              <a:t> </a:t>
-            </a:r>
-            <a:r>
-              <a:rPr sz="1150" spc="60" dirty="0">
-                <a:solidFill>
-                  <a:srgbClr val="404040"/>
-                </a:solidFill>
-                <a:latin typeface="Trebuchet MS"/>
-                <a:cs typeface="Trebuchet MS"/>
-              </a:rPr>
-              <a:t>y</a:t>
-            </a:r>
-            <a:r>
-              <a:rPr sz="1150" spc="45" dirty="0">
-                <a:solidFill>
-                  <a:srgbClr val="404040"/>
-                </a:solidFill>
-                <a:latin typeface="Trebuchet MS"/>
-                <a:cs typeface="Trebuchet MS"/>
-              </a:rPr>
-              <a:t> </a:t>
-            </a:r>
-            <a:r>
-              <a:rPr sz="1150" spc="70" dirty="0">
-                <a:solidFill>
-                  <a:srgbClr val="404040"/>
-                </a:solidFill>
-                <a:latin typeface="Trebuchet MS"/>
-                <a:cs typeface="Trebuchet MS"/>
-              </a:rPr>
-              <a:t>enfermería</a:t>
-            </a:r>
-            <a:endParaRPr sz="1150">
+            <a:endParaRPr sz="1800" dirty="0">
               <a:latin typeface="Trebuchet MS"/>
               <a:cs typeface="Trebuchet MS"/>
             </a:endParaRPr>
@@ -11696,7 +11400,7 @@
               </a:rPr>
               <a:t>S</a:t>
             </a:r>
-            <a:endParaRPr sz="1400">
+            <a:endParaRPr sz="1400" dirty="0">
               <a:latin typeface="Trebuchet MS"/>
               <a:cs typeface="Trebuchet MS"/>
             </a:endParaRPr>
@@ -12179,7 +11883,7 @@
               </a:rPr>
               <a:t>PERU</a:t>
             </a:r>
-            <a:endParaRPr sz="1200">
+            <a:endParaRPr sz="1200" dirty="0">
               <a:latin typeface="Trebuchet MS"/>
               <a:cs typeface="Trebuchet MS"/>
             </a:endParaRPr>
@@ -12194,8 +11898,8 @@
         </p:nvSpPr>
         <p:spPr>
           <a:xfrm>
-            <a:off x="124968" y="1442316"/>
-            <a:ext cx="3423285" cy="1271502"/>
+            <a:off x="47222" y="1442316"/>
+            <a:ext cx="3688407" cy="1425390"/>
           </a:xfrm>
           <a:prstGeom prst="rect">
             <a:avLst/>
@@ -12214,6 +11918,9 @@
               <a:spcBef>
                 <a:spcPts val="375"/>
               </a:spcBef>
+              <a:spcAft>
+                <a:spcPts val="600"/>
+              </a:spcAft>
               <a:buFont typeface="Arial MT"/>
               <a:buChar char="•"/>
               <a:tabLst>
@@ -12302,7 +12009,7 @@
                 <a:spcPct val="100000"/>
               </a:lnSpc>
               <a:spcBef>
-                <a:spcPts val="280"/>
+                <a:spcPts val="260"/>
               </a:spcBef>
             </a:pPr>
             <a:r>
@@ -12416,7 +12123,7 @@
           <a:p>
             <a:pPr marL="469900">
               <a:spcBef>
-                <a:spcPts val="280"/>
+                <a:spcPts val="260"/>
               </a:spcBef>
             </a:pPr>
             <a:r>
@@ -12489,6 +12196,13 @@
               </a:rPr>
               <a:t> </a:t>
             </a:r>
+          </a:p>
+          <a:p>
+            <a:pPr marL="469900">
+              <a:spcBef>
+                <a:spcPts val="260"/>
+              </a:spcBef>
+            </a:pPr>
             <a:r>
               <a:rPr lang="es-419" sz="1200" spc="40" dirty="0">
                 <a:solidFill>
@@ -12549,16 +12263,13 @@
               </a:rPr>
               <a:t>permitiendo </a:t>
             </a:r>
-            <a:r>
-              <a:rPr lang="es-419" sz="1200" spc="75" dirty="0">
-                <a:solidFill>
-                  <a:srgbClr val="404040"/>
-                </a:solidFill>
-                <a:latin typeface="Trebuchet MS"/>
-                <a:cs typeface="Trebuchet MS"/>
-              </a:rPr>
-              <a:t> </a:t>
-            </a:r>
+          </a:p>
+          <a:p>
+            <a:pPr marL="469900">
+              <a:spcBef>
+                <a:spcPts val="260"/>
+              </a:spcBef>
+            </a:pPr>
             <a:r>
               <a:rPr lang="es-419" sz="1200" spc="40" dirty="0">
                 <a:solidFill>
@@ -12644,8 +12355,8 @@
         </p:nvSpPr>
         <p:spPr>
           <a:xfrm>
-            <a:off x="124968" y="3056858"/>
-            <a:ext cx="3668395" cy="1185545"/>
+            <a:off x="55286" y="3001056"/>
+            <a:ext cx="3630673" cy="1201611"/>
           </a:xfrm>
           <a:prstGeom prst="rect">
             <a:avLst/>
@@ -12664,6 +12375,9 @@
               <a:spcBef>
                 <a:spcPts val="370"/>
               </a:spcBef>
+              <a:spcAft>
+                <a:spcPts val="600"/>
+              </a:spcAft>
               <a:buFont typeface="Arial MT"/>
               <a:buChar char="•"/>
               <a:tabLst>
@@ -12748,11 +12462,8 @@
           </a:p>
           <a:p>
             <a:pPr marL="469900">
-              <a:lnSpc>
-                <a:spcPct val="100000"/>
-              </a:lnSpc>
               <a:spcBef>
-                <a:spcPts val="280"/>
+                <a:spcPts val="260"/>
               </a:spcBef>
             </a:pPr>
             <a:r>
@@ -12912,6 +12623,365 @@
           </a:p>
           <a:p>
             <a:pPr marL="469900">
+              <a:spcBef>
+                <a:spcPts val="260"/>
+              </a:spcBef>
+            </a:pPr>
+            <a:r>
+              <a:rPr sz="1200" spc="50" dirty="0">
+                <a:solidFill>
+                  <a:srgbClr val="404040"/>
+                </a:solidFill>
+                <a:latin typeface="Trebuchet MS"/>
+                <a:cs typeface="Trebuchet MS"/>
+              </a:rPr>
+              <a:t>canjear</a:t>
+            </a:r>
+            <a:r>
+              <a:rPr sz="1200" spc="75" dirty="0">
+                <a:solidFill>
+                  <a:srgbClr val="404040"/>
+                </a:solidFill>
+                <a:latin typeface="Trebuchet MS"/>
+                <a:cs typeface="Trebuchet MS"/>
+              </a:rPr>
+              <a:t> </a:t>
+            </a:r>
+            <a:r>
+              <a:rPr sz="1200" spc="65" dirty="0">
+                <a:solidFill>
+                  <a:srgbClr val="404040"/>
+                </a:solidFill>
+                <a:latin typeface="Trebuchet MS"/>
+                <a:cs typeface="Trebuchet MS"/>
+              </a:rPr>
+              <a:t>y</a:t>
+            </a:r>
+            <a:r>
+              <a:rPr sz="1200" spc="50" dirty="0">
+                <a:solidFill>
+                  <a:srgbClr val="404040"/>
+                </a:solidFill>
+                <a:latin typeface="Trebuchet MS"/>
+                <a:cs typeface="Trebuchet MS"/>
+              </a:rPr>
+              <a:t> </a:t>
+            </a:r>
+            <a:r>
+              <a:rPr sz="1200" spc="65" dirty="0">
+                <a:solidFill>
+                  <a:srgbClr val="404040"/>
+                </a:solidFill>
+                <a:latin typeface="Trebuchet MS"/>
+                <a:cs typeface="Trebuchet MS"/>
+              </a:rPr>
+              <a:t>cancerlar</a:t>
+            </a:r>
+            <a:r>
+              <a:rPr sz="1200" spc="80" dirty="0">
+                <a:solidFill>
+                  <a:srgbClr val="404040"/>
+                </a:solidFill>
+                <a:latin typeface="Trebuchet MS"/>
+                <a:cs typeface="Trebuchet MS"/>
+              </a:rPr>
+              <a:t> </a:t>
+            </a:r>
+            <a:r>
+              <a:rPr sz="1200" spc="125" dirty="0">
+                <a:solidFill>
+                  <a:srgbClr val="404040"/>
+                </a:solidFill>
+                <a:latin typeface="Trebuchet MS"/>
+                <a:cs typeface="Trebuchet MS"/>
+              </a:rPr>
+              <a:t>sus</a:t>
+            </a:r>
+            <a:endParaRPr sz="1200" dirty="0">
+              <a:latin typeface="Trebuchet MS"/>
+              <a:cs typeface="Trebuchet MS"/>
+            </a:endParaRPr>
+          </a:p>
+          <a:p>
+            <a:pPr marL="469900" marR="269875">
+              <a:spcBef>
+                <a:spcPts val="260"/>
+              </a:spcBef>
+            </a:pPr>
+            <a:r>
+              <a:rPr sz="1200" spc="95" dirty="0">
+                <a:solidFill>
+                  <a:srgbClr val="404040"/>
+                </a:solidFill>
+                <a:latin typeface="Trebuchet MS"/>
+                <a:cs typeface="Trebuchet MS"/>
+              </a:rPr>
+              <a:t>puntos</a:t>
+            </a:r>
+            <a:r>
+              <a:rPr sz="1200" spc="45" dirty="0">
+                <a:solidFill>
+                  <a:srgbClr val="404040"/>
+                </a:solidFill>
+                <a:latin typeface="Trebuchet MS"/>
+                <a:cs typeface="Trebuchet MS"/>
+              </a:rPr>
+              <a:t> </a:t>
+            </a:r>
+            <a:r>
+              <a:rPr sz="1200" spc="160" dirty="0">
+                <a:solidFill>
+                  <a:srgbClr val="404040"/>
+                </a:solidFill>
+                <a:latin typeface="Trebuchet MS"/>
+                <a:cs typeface="Trebuchet MS"/>
+              </a:rPr>
+              <a:t>BBVA</a:t>
+            </a:r>
+            <a:r>
+              <a:rPr sz="1200" spc="60" dirty="0">
+                <a:solidFill>
+                  <a:srgbClr val="404040"/>
+                </a:solidFill>
+                <a:latin typeface="Trebuchet MS"/>
+                <a:cs typeface="Trebuchet MS"/>
+              </a:rPr>
+              <a:t> </a:t>
+            </a:r>
+            <a:r>
+              <a:rPr sz="1200" spc="80" dirty="0">
+                <a:solidFill>
+                  <a:srgbClr val="404040"/>
+                </a:solidFill>
+                <a:latin typeface="Trebuchet MS"/>
+                <a:cs typeface="Trebuchet MS"/>
+              </a:rPr>
+              <a:t>en</a:t>
+            </a:r>
+            <a:r>
+              <a:rPr sz="1200" spc="60" dirty="0">
+                <a:solidFill>
+                  <a:srgbClr val="404040"/>
+                </a:solidFill>
+                <a:latin typeface="Trebuchet MS"/>
+                <a:cs typeface="Trebuchet MS"/>
+              </a:rPr>
+              <a:t> </a:t>
+            </a:r>
+            <a:r>
+              <a:rPr sz="1200" spc="105" dirty="0">
+                <a:solidFill>
+                  <a:srgbClr val="404040"/>
+                </a:solidFill>
+                <a:latin typeface="Trebuchet MS"/>
+                <a:cs typeface="Trebuchet MS"/>
+              </a:rPr>
+              <a:t>soles</a:t>
+            </a:r>
+            <a:r>
+              <a:rPr sz="1200" spc="65" dirty="0">
+                <a:solidFill>
+                  <a:srgbClr val="404040"/>
+                </a:solidFill>
+                <a:latin typeface="Trebuchet MS"/>
+                <a:cs typeface="Trebuchet MS"/>
+              </a:rPr>
+              <a:t> </a:t>
+            </a:r>
+            <a:r>
+              <a:rPr sz="1200" spc="70" dirty="0">
+                <a:solidFill>
+                  <a:srgbClr val="404040"/>
+                </a:solidFill>
+                <a:latin typeface="Trebuchet MS"/>
+                <a:cs typeface="Trebuchet MS"/>
+              </a:rPr>
+              <a:t>por</a:t>
+            </a:r>
+            <a:r>
+              <a:rPr sz="1200" spc="85" dirty="0">
+                <a:solidFill>
+                  <a:srgbClr val="404040"/>
+                </a:solidFill>
+                <a:latin typeface="Trebuchet MS"/>
+                <a:cs typeface="Trebuchet MS"/>
+              </a:rPr>
+              <a:t> </a:t>
+            </a:r>
+            <a:r>
+              <a:rPr sz="1200" spc="80" dirty="0">
+                <a:solidFill>
+                  <a:srgbClr val="404040"/>
+                </a:solidFill>
+                <a:latin typeface="Trebuchet MS"/>
+                <a:cs typeface="Trebuchet MS"/>
+              </a:rPr>
+              <a:t>pasajes</a:t>
+            </a:r>
+            <a:r>
+              <a:rPr sz="1200" spc="85" dirty="0">
+                <a:solidFill>
+                  <a:srgbClr val="404040"/>
+                </a:solidFill>
+                <a:latin typeface="Trebuchet MS"/>
+                <a:cs typeface="Trebuchet MS"/>
+              </a:rPr>
+              <a:t> </a:t>
+            </a:r>
+            <a:r>
+              <a:rPr sz="1200" spc="105" dirty="0" err="1">
+                <a:solidFill>
+                  <a:srgbClr val="404040"/>
+                </a:solidFill>
+                <a:latin typeface="Trebuchet MS"/>
+                <a:cs typeface="Trebuchet MS"/>
+              </a:rPr>
+              <a:t>en</a:t>
+            </a:r>
+            <a:r>
+              <a:rPr sz="1200" spc="105" dirty="0">
+                <a:solidFill>
+                  <a:srgbClr val="404040"/>
+                </a:solidFill>
+                <a:latin typeface="Trebuchet MS"/>
+                <a:cs typeface="Trebuchet MS"/>
+              </a:rPr>
+              <a:t> </a:t>
+            </a:r>
+            <a:endParaRPr lang="es-ES" sz="1200" spc="105" dirty="0">
+              <a:solidFill>
+                <a:srgbClr val="404040"/>
+              </a:solidFill>
+              <a:latin typeface="Trebuchet MS"/>
+              <a:cs typeface="Trebuchet MS"/>
+            </a:endParaRPr>
+          </a:p>
+          <a:p>
+            <a:pPr marL="469900" marR="269875">
+              <a:spcBef>
+                <a:spcPts val="260"/>
+              </a:spcBef>
+            </a:pPr>
+            <a:r>
+              <a:rPr sz="1200" spc="-345" dirty="0">
+                <a:solidFill>
+                  <a:srgbClr val="404040"/>
+                </a:solidFill>
+                <a:latin typeface="Trebuchet MS"/>
+                <a:cs typeface="Trebuchet MS"/>
+              </a:rPr>
+              <a:t> </a:t>
+            </a:r>
+            <a:r>
+              <a:rPr sz="1200" spc="55" dirty="0">
+                <a:solidFill>
+                  <a:srgbClr val="404040"/>
+                </a:solidFill>
+                <a:latin typeface="Trebuchet MS"/>
+                <a:cs typeface="Trebuchet MS"/>
+              </a:rPr>
+              <a:t>aerolíneas.</a:t>
+            </a:r>
+            <a:endParaRPr sz="1200" dirty="0">
+              <a:latin typeface="Trebuchet MS"/>
+              <a:cs typeface="Trebuchet MS"/>
+            </a:endParaRPr>
+          </a:p>
+        </p:txBody>
+      </p:sp>
+      <p:sp>
+        <p:nvSpPr>
+          <p:cNvPr id="30" name="CuadroTexto 29">
+            <a:extLst>
+              <a:ext uri="{FF2B5EF4-FFF2-40B4-BE49-F238E27FC236}">
+                <a16:creationId xmlns:a16="http://schemas.microsoft.com/office/drawing/2014/main" id="{ABDAC9BD-2A68-4D91-5C01-167CDF401E03}"/>
+              </a:ext>
+            </a:extLst>
+          </p:cNvPr>
+          <p:cNvSpPr txBox="1"/>
+          <p:nvPr/>
+        </p:nvSpPr>
+        <p:spPr>
+          <a:xfrm>
+            <a:off x="3846523" y="4403359"/>
+            <a:ext cx="3406140" cy="518091"/>
+          </a:xfrm>
+          <a:prstGeom prst="rect">
+            <a:avLst/>
+          </a:prstGeom>
+          <a:noFill/>
+        </p:spPr>
+        <p:txBody>
+          <a:bodyPr wrap="square">
+            <a:spAutoFit/>
+          </a:bodyPr>
+          <a:lstStyle/>
+          <a:p>
+            <a:pPr marL="102870">
+              <a:lnSpc>
+                <a:spcPct val="100000"/>
+              </a:lnSpc>
+              <a:spcBef>
+                <a:spcPts val="815"/>
+              </a:spcBef>
+            </a:pPr>
+            <a:r>
+              <a:rPr lang="es-419" sz="1200" b="1" spc="110" dirty="0">
+                <a:solidFill>
+                  <a:srgbClr val="404040"/>
+                </a:solidFill>
+                <a:latin typeface="Trebuchet MS"/>
+                <a:cs typeface="Trebuchet MS"/>
+              </a:rPr>
+              <a:t>SALIDA</a:t>
+            </a:r>
+            <a:r>
+              <a:rPr lang="es-419" sz="1200" b="1" spc="10" dirty="0">
+                <a:solidFill>
+                  <a:srgbClr val="404040"/>
+                </a:solidFill>
+                <a:latin typeface="Trebuchet MS"/>
+                <a:cs typeface="Trebuchet MS"/>
+              </a:rPr>
+              <a:t> </a:t>
+            </a:r>
+            <a:r>
+              <a:rPr lang="es-419" sz="1200" b="1" spc="50" dirty="0">
+                <a:solidFill>
+                  <a:srgbClr val="404040"/>
+                </a:solidFill>
+                <a:latin typeface="Trebuchet MS"/>
+                <a:cs typeface="Trebuchet MS"/>
+              </a:rPr>
+              <a:t>A</a:t>
+            </a:r>
+            <a:r>
+              <a:rPr lang="es-419" sz="1200" b="1" spc="20" dirty="0">
+                <a:solidFill>
+                  <a:srgbClr val="404040"/>
+                </a:solidFill>
+                <a:latin typeface="Trebuchet MS"/>
+                <a:cs typeface="Trebuchet MS"/>
+              </a:rPr>
+              <a:t> </a:t>
+            </a:r>
+            <a:r>
+              <a:rPr lang="es-419" sz="1200" b="1" spc="130" dirty="0">
+                <a:solidFill>
+                  <a:srgbClr val="404040"/>
+                </a:solidFill>
+                <a:latin typeface="Trebuchet MS"/>
+                <a:cs typeface="Trebuchet MS"/>
+              </a:rPr>
+              <a:t>PRODUCCION</a:t>
+            </a:r>
+            <a:endParaRPr lang="es-419" sz="1200" dirty="0">
+              <a:latin typeface="Trebuchet MS"/>
+              <a:cs typeface="Trebuchet MS"/>
+            </a:endParaRPr>
+          </a:p>
+          <a:p>
+            <a:pPr marL="96520">
               <a:lnSpc>
                 <a:spcPct val="100000"/>
               </a:lnSpc>
@@ -12920,27 +12990,107 @@
               </a:spcBef>
             </a:pPr>
             <a:r>
-              <a:rPr sz="1200" spc="50" dirty="0">
-                <a:solidFill>
-                  <a:srgbClr val="404040"/>
-                </a:solidFill>
-                <a:latin typeface="Trebuchet MS"/>
-                <a:cs typeface="Trebuchet MS"/>
-              </a:rPr>
-              <a:t>canjear</a:t>
-            </a:r>
-            <a:r>
-              <a:rPr sz="1200" spc="75" dirty="0">
-                <a:solidFill>
-                  <a:srgbClr val="404040"/>
-                </a:solidFill>
-                <a:latin typeface="Trebuchet MS"/>
-                <a:cs typeface="Trebuchet MS"/>
-              </a:rPr>
-              <a:t> </a:t>
-            </a:r>
-            <a:r>
-              <a:rPr sz="1200" spc="65" dirty="0">
+              <a:rPr lang="es-419" sz="1150" spc="114" dirty="0">
+                <a:solidFill>
+                  <a:srgbClr val="404040"/>
+                </a:solidFill>
+                <a:latin typeface="Trebuchet MS"/>
+                <a:cs typeface="Trebuchet MS"/>
+              </a:rPr>
+              <a:t>De</a:t>
+            </a:r>
+            <a:r>
+              <a:rPr lang="es-419" sz="1150" spc="65" dirty="0">
+                <a:solidFill>
+                  <a:srgbClr val="404040"/>
+                </a:solidFill>
+                <a:latin typeface="Trebuchet MS"/>
+                <a:cs typeface="Trebuchet MS"/>
+              </a:rPr>
+              <a:t> </a:t>
+            </a:r>
+            <a:r>
+              <a:rPr lang="es-419" sz="1150" spc="85" dirty="0">
+                <a:solidFill>
+                  <a:srgbClr val="404040"/>
+                </a:solidFill>
+                <a:latin typeface="Trebuchet MS"/>
+                <a:cs typeface="Trebuchet MS"/>
+              </a:rPr>
+              <a:t>los</a:t>
+            </a:r>
+            <a:r>
+              <a:rPr lang="es-419" sz="1150" spc="45" dirty="0">
+                <a:solidFill>
+                  <a:srgbClr val="404040"/>
+                </a:solidFill>
+                <a:latin typeface="Trebuchet MS"/>
+                <a:cs typeface="Trebuchet MS"/>
+              </a:rPr>
+              <a:t> </a:t>
+            </a:r>
+            <a:r>
+              <a:rPr lang="es-419" sz="1150" spc="114" dirty="0">
+                <a:solidFill>
+                  <a:srgbClr val="404040"/>
+                </a:solidFill>
+                <a:latin typeface="Trebuchet MS"/>
+                <a:cs typeface="Trebuchet MS"/>
+              </a:rPr>
+              <a:t>módulos</a:t>
+            </a:r>
+            <a:r>
+              <a:rPr lang="es-419" sz="1150" spc="30" dirty="0">
+                <a:solidFill>
+                  <a:srgbClr val="404040"/>
+                </a:solidFill>
+                <a:latin typeface="Trebuchet MS"/>
+                <a:cs typeface="Trebuchet MS"/>
+              </a:rPr>
+              <a:t> </a:t>
+            </a:r>
+            <a:r>
+              <a:rPr lang="es-419" sz="1150" spc="95" dirty="0">
+                <a:solidFill>
+                  <a:srgbClr val="404040"/>
+                </a:solidFill>
+                <a:latin typeface="Trebuchet MS"/>
+                <a:cs typeface="Trebuchet MS"/>
+              </a:rPr>
+              <a:t>de</a:t>
+            </a:r>
+            <a:r>
+              <a:rPr lang="es-419" sz="1150" spc="80" dirty="0">
+                <a:solidFill>
+                  <a:srgbClr val="404040"/>
+                </a:solidFill>
+                <a:latin typeface="Trebuchet MS"/>
+                <a:cs typeface="Trebuchet MS"/>
+              </a:rPr>
+              <a:t> </a:t>
+            </a:r>
+            <a:r>
+              <a:rPr lang="es-419" sz="1150" spc="70" dirty="0">
+                <a:solidFill>
+                  <a:srgbClr val="404040"/>
+                </a:solidFill>
+                <a:latin typeface="Trebuchet MS"/>
+                <a:cs typeface="Trebuchet MS"/>
+              </a:rPr>
+              <a:t>atención</a:t>
+            </a:r>
+            <a:r>
+              <a:rPr lang="es-419" sz="1150" spc="45" dirty="0">
+                <a:solidFill>
+                  <a:srgbClr val="404040"/>
+                </a:solidFill>
+                <a:latin typeface="Trebuchet MS"/>
+                <a:cs typeface="Trebuchet MS"/>
+              </a:rPr>
+              <a:t> </a:t>
+            </a:r>
+            <a:r>
+              <a:rPr lang="es-419" sz="1150" spc="60" dirty="0">
                 <a:solidFill>
                   <a:srgbClr val="404040"/>
                 </a:solidFill>
@@ -12950,210 +13100,146 @@
               <a:t>y</a:t>
             </a:r>
             <a:r>
-              <a:rPr sz="1200" spc="50" dirty="0">
-                <a:solidFill>
-                  <a:srgbClr val="404040"/>
-                </a:solidFill>
-                <a:latin typeface="Trebuchet MS"/>
-                <a:cs typeface="Trebuchet MS"/>
-              </a:rPr>
-              <a:t> </a:t>
-            </a:r>
-            <a:r>
-              <a:rPr sz="1200" spc="65" dirty="0">
-                <a:solidFill>
-                  <a:srgbClr val="404040"/>
-                </a:solidFill>
-                <a:latin typeface="Trebuchet MS"/>
-                <a:cs typeface="Trebuchet MS"/>
-              </a:rPr>
-              <a:t>cancerlar</a:t>
-            </a:r>
-            <a:r>
-              <a:rPr sz="1200" spc="80" dirty="0">
-                <a:solidFill>
-                  <a:srgbClr val="404040"/>
-                </a:solidFill>
-                <a:latin typeface="Trebuchet MS"/>
-                <a:cs typeface="Trebuchet MS"/>
-              </a:rPr>
-              <a:t> </a:t>
-            </a:r>
-            <a:r>
-              <a:rPr sz="1200" spc="125" dirty="0">
-                <a:solidFill>
-                  <a:srgbClr val="404040"/>
-                </a:solidFill>
-                <a:latin typeface="Trebuchet MS"/>
-                <a:cs typeface="Trebuchet MS"/>
-              </a:rPr>
-              <a:t>sus</a:t>
-            </a:r>
-            <a:endParaRPr sz="1200" dirty="0">
+              <a:rPr lang="es-419" sz="1150" spc="45" dirty="0">
+                <a:solidFill>
+                  <a:srgbClr val="404040"/>
+                </a:solidFill>
+                <a:latin typeface="Trebuchet MS"/>
+                <a:cs typeface="Trebuchet MS"/>
+              </a:rPr>
+              <a:t> </a:t>
+            </a:r>
+            <a:r>
+              <a:rPr lang="es-419" sz="1150" spc="70" dirty="0">
+                <a:solidFill>
+                  <a:srgbClr val="404040"/>
+                </a:solidFill>
+                <a:latin typeface="Trebuchet MS"/>
+                <a:cs typeface="Trebuchet MS"/>
+              </a:rPr>
+              <a:t>enfermería</a:t>
+            </a:r>
+            <a:endParaRPr lang="es-419" sz="1150" dirty="0">
               <a:latin typeface="Trebuchet MS"/>
               <a:cs typeface="Trebuchet MS"/>
             </a:endParaRPr>
           </a:p>
+        </p:txBody>
+      </p:sp>
+      <p:sp>
+        <p:nvSpPr>
+          <p:cNvPr id="32" name="CuadroTexto 31">
+            <a:extLst>
+              <a:ext uri="{FF2B5EF4-FFF2-40B4-BE49-F238E27FC236}">
+                <a16:creationId xmlns:a16="http://schemas.microsoft.com/office/drawing/2014/main" id="{D8891216-CAE5-02C7-B7CE-CE80972C4BFF}"/>
+              </a:ext>
+            </a:extLst>
+          </p:cNvPr>
+          <p:cNvSpPr txBox="1"/>
+          <p:nvPr/>
+        </p:nvSpPr>
+        <p:spPr>
+          <a:xfrm>
+            <a:off x="3837417" y="4056669"/>
+            <a:ext cx="3794760" cy="307777"/>
+          </a:xfrm>
+          <a:prstGeom prst="rect">
+            <a:avLst/>
+          </a:prstGeom>
+          <a:noFill/>
+        </p:spPr>
+        <p:txBody>
+          <a:bodyPr wrap="square">
+            <a:spAutoFit/>
+          </a:bodyPr>
+          <a:lstStyle/>
           <a:p>
-            <a:pPr marL="469900" marR="269875">
+            <a:pPr marL="12700">
               <a:lnSpc>
-                <a:spcPct val="131700"/>
+                <a:spcPct val="100000"/>
               </a:lnSpc>
               <a:spcBef>
-                <a:spcPts val="10"/>
+                <a:spcPts val="1070"/>
               </a:spcBef>
             </a:pPr>
             <a:r>
-              <a:rPr sz="1200" spc="95" dirty="0">
-                <a:solidFill>
-                  <a:srgbClr val="404040"/>
-                </a:solidFill>
-                <a:latin typeface="Trebuchet MS"/>
-                <a:cs typeface="Trebuchet MS"/>
-              </a:rPr>
-              <a:t>puntos</a:t>
-            </a:r>
-            <a:r>
-              <a:rPr sz="1200" spc="45" dirty="0">
-                <a:solidFill>
-                  <a:srgbClr val="404040"/>
-                </a:solidFill>
-                <a:latin typeface="Trebuchet MS"/>
-                <a:cs typeface="Trebuchet MS"/>
-              </a:rPr>
-              <a:t> </a:t>
-            </a:r>
-            <a:r>
-              <a:rPr sz="1200" spc="160" dirty="0">
-                <a:solidFill>
-                  <a:srgbClr val="404040"/>
-                </a:solidFill>
-                <a:latin typeface="Trebuchet MS"/>
-                <a:cs typeface="Trebuchet MS"/>
-              </a:rPr>
-              <a:t>BBVA</a:t>
-            </a:r>
-            <a:r>
-              <a:rPr sz="1200" spc="60" dirty="0">
-                <a:solidFill>
-                  <a:srgbClr val="404040"/>
-                </a:solidFill>
-                <a:latin typeface="Trebuchet MS"/>
-                <a:cs typeface="Trebuchet MS"/>
-              </a:rPr>
-              <a:t> </a:t>
-            </a:r>
-            <a:r>
-              <a:rPr sz="1200" spc="80" dirty="0">
-                <a:solidFill>
-                  <a:srgbClr val="404040"/>
-                </a:solidFill>
-                <a:latin typeface="Trebuchet MS"/>
-                <a:cs typeface="Trebuchet MS"/>
-              </a:rPr>
-              <a:t>en</a:t>
-            </a:r>
-            <a:r>
-              <a:rPr sz="1200" spc="60" dirty="0">
-                <a:solidFill>
-                  <a:srgbClr val="404040"/>
-                </a:solidFill>
-                <a:latin typeface="Trebuchet MS"/>
-                <a:cs typeface="Trebuchet MS"/>
-              </a:rPr>
-              <a:t> </a:t>
-            </a:r>
-            <a:r>
-              <a:rPr sz="1200" spc="105" dirty="0">
-                <a:solidFill>
-                  <a:srgbClr val="404040"/>
-                </a:solidFill>
-                <a:latin typeface="Trebuchet MS"/>
-                <a:cs typeface="Trebuchet MS"/>
-              </a:rPr>
-              <a:t>soles</a:t>
-            </a:r>
-            <a:r>
-              <a:rPr sz="1200" spc="65" dirty="0">
-                <a:solidFill>
-                  <a:srgbClr val="404040"/>
-                </a:solidFill>
-                <a:latin typeface="Trebuchet MS"/>
-                <a:cs typeface="Trebuchet MS"/>
-              </a:rPr>
-              <a:t> </a:t>
-            </a:r>
-            <a:r>
-              <a:rPr sz="1200" spc="70" dirty="0">
-                <a:solidFill>
-                  <a:srgbClr val="404040"/>
-                </a:solidFill>
-                <a:latin typeface="Trebuchet MS"/>
-                <a:cs typeface="Trebuchet MS"/>
-              </a:rPr>
-              <a:t>por</a:t>
-            </a:r>
-            <a:r>
-              <a:rPr sz="1200" spc="85" dirty="0">
-                <a:solidFill>
-                  <a:srgbClr val="404040"/>
-                </a:solidFill>
-                <a:latin typeface="Trebuchet MS"/>
-                <a:cs typeface="Trebuchet MS"/>
-              </a:rPr>
-              <a:t> </a:t>
-            </a:r>
-            <a:r>
-              <a:rPr sz="1200" spc="80" dirty="0">
-                <a:solidFill>
-                  <a:srgbClr val="404040"/>
-                </a:solidFill>
-                <a:latin typeface="Trebuchet MS"/>
-                <a:cs typeface="Trebuchet MS"/>
-              </a:rPr>
-              <a:t>pasajes</a:t>
-            </a:r>
-            <a:r>
-              <a:rPr sz="1200" spc="85" dirty="0">
-                <a:solidFill>
-                  <a:srgbClr val="404040"/>
-                </a:solidFill>
-                <a:latin typeface="Trebuchet MS"/>
-                <a:cs typeface="Trebuchet MS"/>
-              </a:rPr>
-              <a:t> </a:t>
-            </a:r>
-            <a:r>
-              <a:rPr sz="1200" spc="105" dirty="0">
-                <a:solidFill>
-                  <a:srgbClr val="404040"/>
-                </a:solidFill>
-                <a:latin typeface="Trebuchet MS"/>
-                <a:cs typeface="Trebuchet MS"/>
-              </a:rPr>
-              <a:t>en </a:t>
-            </a:r>
-            <a:r>
-              <a:rPr sz="1200" spc="-345" dirty="0">
-                <a:solidFill>
-                  <a:srgbClr val="404040"/>
-                </a:solidFill>
-                <a:latin typeface="Trebuchet MS"/>
-                <a:cs typeface="Trebuchet MS"/>
-              </a:rPr>
-              <a:t> </a:t>
-            </a:r>
-            <a:r>
-              <a:rPr sz="1200" spc="55" dirty="0">
-                <a:solidFill>
-                  <a:srgbClr val="404040"/>
-                </a:solidFill>
-                <a:latin typeface="Trebuchet MS"/>
-                <a:cs typeface="Trebuchet MS"/>
-              </a:rPr>
-              <a:t>aerolíneas.</a:t>
-            </a:r>
-            <a:endParaRPr sz="1200" dirty="0">
+              <a:rPr lang="es-419" sz="1400" b="1" spc="50" dirty="0">
+                <a:latin typeface="Trebuchet MS"/>
+                <a:cs typeface="Trebuchet MS"/>
+              </a:rPr>
+              <a:t>L</a:t>
+            </a:r>
+            <a:r>
+              <a:rPr lang="es-419" sz="1400" b="1" spc="-210" dirty="0">
+                <a:latin typeface="Trebuchet MS"/>
+                <a:cs typeface="Trebuchet MS"/>
+              </a:rPr>
+              <a:t> </a:t>
+            </a:r>
+            <a:r>
+              <a:rPr lang="es-419" sz="1400" b="1" spc="85" dirty="0">
+                <a:latin typeface="Trebuchet MS"/>
+                <a:cs typeface="Trebuchet MS"/>
+              </a:rPr>
+              <a:t>O</a:t>
+            </a:r>
+            <a:r>
+              <a:rPr lang="es-419" sz="1400" b="1" spc="-210" dirty="0">
+                <a:latin typeface="Trebuchet MS"/>
+                <a:cs typeface="Trebuchet MS"/>
+              </a:rPr>
+              <a:t> </a:t>
+            </a:r>
+            <a:r>
+              <a:rPr lang="es-419" sz="1400" b="1" spc="85" dirty="0">
+                <a:latin typeface="Trebuchet MS"/>
+                <a:cs typeface="Trebuchet MS"/>
+              </a:rPr>
+              <a:t>G</a:t>
+            </a:r>
+            <a:r>
+              <a:rPr lang="es-419" sz="1400" b="1" spc="-204" dirty="0">
+                <a:latin typeface="Trebuchet MS"/>
+                <a:cs typeface="Trebuchet MS"/>
+              </a:rPr>
+              <a:t> </a:t>
+            </a:r>
+            <a:r>
+              <a:rPr lang="es-419" sz="1400" b="1" spc="85" dirty="0">
+                <a:latin typeface="Trebuchet MS"/>
+                <a:cs typeface="Trebuchet MS"/>
+              </a:rPr>
+              <a:t>R</a:t>
+            </a:r>
+            <a:r>
+              <a:rPr lang="es-419" sz="1400" b="1" spc="-215" dirty="0">
+                <a:latin typeface="Trebuchet MS"/>
+                <a:cs typeface="Trebuchet MS"/>
+              </a:rPr>
+              <a:t> </a:t>
+            </a:r>
+            <a:r>
+              <a:rPr lang="es-419" sz="1400" b="1" spc="85" dirty="0">
+                <a:latin typeface="Trebuchet MS"/>
+                <a:cs typeface="Trebuchet MS"/>
+              </a:rPr>
+              <a:t>O</a:t>
+            </a:r>
+            <a:r>
+              <a:rPr lang="es-419" sz="1400" b="1" spc="-225" dirty="0">
+                <a:latin typeface="Trebuchet MS"/>
+                <a:cs typeface="Trebuchet MS"/>
+              </a:rPr>
+              <a:t> </a:t>
+            </a:r>
+            <a:r>
+              <a:rPr lang="es-419" sz="1400" b="1" spc="150" dirty="0">
+                <a:latin typeface="Trebuchet MS"/>
+                <a:cs typeface="Trebuchet MS"/>
+              </a:rPr>
+              <a:t>S</a:t>
+            </a:r>
+            <a:endParaRPr lang="es-419" sz="1400" dirty="0">
               <a:latin typeface="Trebuchet MS"/>
               <a:cs typeface="Trebuchet MS"/>
             </a:endParaRPr>

</xml_diff>